<commit_message>
predicting on probability now
</commit_message>
<xml_diff>
--- a/Presentation.pptx
+++ b/Presentation.pptx
@@ -5,7 +5,7 @@
     <p:sldMasterId id="2147483648" r:id="rId1"/>
   </p:sldMasterIdLst>
   <p:notesMasterIdLst>
-    <p:notesMasterId r:id="rId15"/>
+    <p:notesMasterId r:id="rId14"/>
   </p:notesMasterIdLst>
   <p:sldIdLst>
     <p:sldId id="256" r:id="rId2"/>
@@ -14,13 +14,12 @@
     <p:sldId id="259" r:id="rId5"/>
     <p:sldId id="268" r:id="rId6"/>
     <p:sldId id="275" r:id="rId7"/>
-    <p:sldId id="261" r:id="rId8"/>
-    <p:sldId id="267" r:id="rId9"/>
-    <p:sldId id="274" r:id="rId10"/>
+    <p:sldId id="276" r:id="rId8"/>
+    <p:sldId id="277" r:id="rId9"/>
+    <p:sldId id="278" r:id="rId10"/>
     <p:sldId id="269" r:id="rId11"/>
-    <p:sldId id="270" r:id="rId12"/>
-    <p:sldId id="266" r:id="rId13"/>
-    <p:sldId id="273" r:id="rId14"/>
+    <p:sldId id="266" r:id="rId12"/>
+    <p:sldId id="273" r:id="rId13"/>
   </p:sldIdLst>
   <p:sldSz cx="12192000" cy="6858000"/>
   <p:notesSz cx="6858000" cy="9144000"/>
@@ -230,22 +229,22 @@
                   <c:v>Logistic Regression</c:v>
                 </c:pt>
                 <c:pt idx="1">
-                  <c:v>Decision Tree Classifier</c:v>
+                  <c:v>Neural Network MLP Classification</c:v>
                 </c:pt>
                 <c:pt idx="2">
+                  <c:v>Lasso Regression</c:v>
+                </c:pt>
+                <c:pt idx="3">
                   <c:v>K Nearest Neighbors</c:v>
                 </c:pt>
-                <c:pt idx="3">
+                <c:pt idx="4">
                   <c:v>Support Vector Classification</c:v>
                 </c:pt>
-                <c:pt idx="4">
+                <c:pt idx="5">
                   <c:v>Support Vector Regression</c:v>
                 </c:pt>
-                <c:pt idx="5">
+                <c:pt idx="6">
                   <c:v>Naïve Bayes GaussianNB</c:v>
-                </c:pt>
-                <c:pt idx="6">
-                  <c:v>Neural Network MLP Classification</c:v>
                 </c:pt>
               </c:strCache>
             </c:strRef>
@@ -257,32 +256,32 @@
                 <c:formatCode>0.00%</c:formatCode>
                 <c:ptCount val="7"/>
                 <c:pt idx="0">
-                  <c:v>0.77329999999999999</c:v>
+                  <c:v>0.84199999999999997</c:v>
                 </c:pt>
                 <c:pt idx="1">
-                  <c:v>0.70660000000000001</c:v>
+                  <c:v>0.84199999999999997</c:v>
                 </c:pt>
                 <c:pt idx="2">
+                  <c:v>0.76129999999999998</c:v>
+                </c:pt>
+                <c:pt idx="3">
                   <c:v>0.69330000000000003</c:v>
-                </c:pt>
-                <c:pt idx="3" formatCode="0%">
-                  <c:v>0.68</c:v>
                 </c:pt>
                 <c:pt idx="4" formatCode="0%">
                   <c:v>0.68</c:v>
                 </c:pt>
                 <c:pt idx="5" formatCode="0%">
-                  <c:v>0.64</c:v>
+                  <c:v>0.68</c:v>
                 </c:pt>
                 <c:pt idx="6" formatCode="0%">
-                  <c:v>0.6</c:v>
+                  <c:v>0.64</c:v>
                 </c:pt>
               </c:numCache>
             </c:numRef>
           </c:val>
           <c:extLst>
             <c:ext xmlns:c16="http://schemas.microsoft.com/office/drawing/2014/chart" uri="{C3380CC4-5D6E-409C-BE32-E72D297353CC}">
-              <c16:uniqueId val="{00000000-F311-4B84-A089-FBDE358CF8DB}"/>
+              <c16:uniqueId val="{00000000-397E-4D94-834C-B6B1FB9A4D6A}"/>
             </c:ext>
           </c:extLst>
         </c:ser>
@@ -5691,7 +5690,7 @@
           <a:p>
             <a:r>
               <a:rPr lang="en-US" dirty="0"/>
-              <a:t>Parameter Tuning</a:t>
+              <a:t>Parameter Tuning Log Regression</a:t>
             </a:r>
           </a:p>
         </p:txBody>
@@ -5819,118 +5818,6 @@
       </p:grpSpPr>
       <p:sp>
         <p:nvSpPr>
-          <p:cNvPr id="2" name="Title 1">
-            <a:extLst>
-              <a:ext uri="{FF2B5EF4-FFF2-40B4-BE49-F238E27FC236}">
-                <a16:creationId xmlns:a16="http://schemas.microsoft.com/office/drawing/2014/main" id="{9C35B7DC-2A12-4643-B7AD-ECD5013888CC}"/>
-              </a:ext>
-            </a:extLst>
-          </p:cNvPr>
-          <p:cNvSpPr>
-            <a:spLocks noGrp="1"/>
-          </p:cNvSpPr>
-          <p:nvPr>
-            <p:ph type="title"/>
-          </p:nvPr>
-        </p:nvSpPr>
-        <p:spPr/>
-        <p:txBody>
-          <a:bodyPr/>
-          <a:lstStyle/>
-          <a:p>
-            <a:r>
-              <a:rPr lang="en-US" dirty="0"/>
-              <a:t>Ranking Result Explained</a:t>
-            </a:r>
-          </a:p>
-        </p:txBody>
-      </p:sp>
-      <p:sp>
-        <p:nvSpPr>
-          <p:cNvPr id="3" name="Content Placeholder 2">
-            <a:extLst>
-              <a:ext uri="{FF2B5EF4-FFF2-40B4-BE49-F238E27FC236}">
-                <a16:creationId xmlns:a16="http://schemas.microsoft.com/office/drawing/2014/main" id="{6D44159F-1847-4B25-8583-5B80C4B7C501}"/>
-              </a:ext>
-            </a:extLst>
-          </p:cNvPr>
-          <p:cNvSpPr>
-            <a:spLocks noGrp="1"/>
-          </p:cNvSpPr>
-          <p:nvPr>
-            <p:ph idx="1"/>
-          </p:nvPr>
-        </p:nvSpPr>
-        <p:spPr/>
-        <p:txBody>
-          <a:bodyPr/>
-          <a:lstStyle/>
-          <a:p>
-            <a:r>
-              <a:rPr lang="en-US" dirty="0"/>
-              <a:t>Training Data: 175 Rows (70%)</a:t>
-            </a:r>
-          </a:p>
-          <a:p>
-            <a:r>
-              <a:rPr lang="en-US" dirty="0"/>
-              <a:t>Validation Data: 75 Rows (30%)</a:t>
-            </a:r>
-          </a:p>
-          <a:p>
-            <a:r>
-              <a:rPr lang="en-US" dirty="0"/>
-              <a:t>Best Performer: Logistic Regression</a:t>
-            </a:r>
-          </a:p>
-          <a:p>
-            <a:pPr lvl="1"/>
-            <a:r>
-              <a:rPr lang="en-US" dirty="0"/>
-              <a:t>Validation Accuracy: 77.33%</a:t>
-            </a:r>
-          </a:p>
-          <a:p>
-            <a:pPr lvl="1"/>
-            <a:r>
-              <a:rPr lang="en-US" dirty="0"/>
-              <a:t>Testing Accuracy: 73.35%</a:t>
-            </a:r>
-          </a:p>
-        </p:txBody>
-      </p:sp>
-    </p:spTree>
-    <p:extLst>
-      <p:ext uri="{BB962C8B-B14F-4D97-AF65-F5344CB8AC3E}">
-        <p14:creationId xmlns:p14="http://schemas.microsoft.com/office/powerpoint/2010/main" val="1885164894"/>
-      </p:ext>
-    </p:extLst>
-  </p:cSld>
-  <p:clrMapOvr>
-    <a:masterClrMapping/>
-  </p:clrMapOvr>
-</p:sld>
-</file>
-
-<file path=ppt/slides/slide12.xml><?xml version="1.0" encoding="utf-8"?>
-<p:sld xmlns:a="http://schemas.openxmlformats.org/drawingml/2006/main" xmlns:r="http://schemas.openxmlformats.org/officeDocument/2006/relationships" xmlns:p="http://schemas.openxmlformats.org/presentationml/2006/main">
-  <p:cSld>
-    <p:spTree>
-      <p:nvGrpSpPr>
-        <p:cNvPr id="1" name=""/>
-        <p:cNvGrpSpPr/>
-        <p:nvPr/>
-      </p:nvGrpSpPr>
-      <p:grpSpPr>
-        <a:xfrm>
-          <a:off x="0" y="0"/>
-          <a:ext cx="0" cy="0"/>
-          <a:chOff x="0" y="0"/>
-          <a:chExt cx="0" cy="0"/>
-        </a:xfrm>
-      </p:grpSpPr>
-      <p:sp>
-        <p:nvSpPr>
           <p:cNvPr id="2" name="Titel 1">
             <a:extLst>
               <a:ext uri="{FF2B5EF4-FFF2-40B4-BE49-F238E27FC236}">
@@ -6012,7 +5899,7 @@
 </p:sld>
 </file>
 
-<file path=ppt/slides/slide13.xml><?xml version="1.0" encoding="utf-8"?>
+<file path=ppt/slides/slide12.xml><?xml version="1.0" encoding="utf-8"?>
 <p:sld xmlns:a="http://schemas.openxmlformats.org/drawingml/2006/main" xmlns:r="http://schemas.openxmlformats.org/officeDocument/2006/relationships" xmlns:p="http://schemas.openxmlformats.org/presentationml/2006/main">
   <p:cSld>
     <p:spTree>
@@ -6442,6 +6329,14 @@
 <file path=ppt/slides/slide5.xml><?xml version="1.0" encoding="utf-8"?>
 <p:sld xmlns:a="http://schemas.openxmlformats.org/drawingml/2006/main" xmlns:r="http://schemas.openxmlformats.org/officeDocument/2006/relationships" xmlns:p="http://schemas.openxmlformats.org/presentationml/2006/main">
   <p:cSld>
+    <p:bg>
+      <p:bgPr>
+        <a:solidFill>
+          <a:schemeClr val="bg1"/>
+        </a:solidFill>
+        <a:effectLst/>
+      </p:bgPr>
+    </p:bg>
     <p:spTree>
       <p:nvGrpSpPr>
         <p:cNvPr id="1" name=""/>
@@ -6472,9 +6367,16 @@
             <p:ph type="title"/>
           </p:nvPr>
         </p:nvSpPr>
-        <p:spPr/>
-        <p:txBody>
-          <a:bodyPr/>
+        <p:spPr>
+          <a:xfrm>
+            <a:off x="838200" y="365125"/>
+            <a:ext cx="10515600" cy="1325563"/>
+          </a:xfrm>
+        </p:spPr>
+        <p:txBody>
+          <a:bodyPr>
+            <a:normAutofit/>
+          </a:bodyPr>
           <a:lstStyle/>
           <a:p>
             <a:r>
@@ -6486,7 +6388,7 @@
       </p:sp>
       <p:graphicFrame>
         <p:nvGraphicFramePr>
-          <p:cNvPr id="7" name="Content Placeholder 6">
+          <p:cNvPr id="5" name="Content Placeholder 4">
             <a:extLst>
               <a:ext uri="{FF2B5EF4-FFF2-40B4-BE49-F238E27FC236}">
                 <a16:creationId xmlns:a16="http://schemas.microsoft.com/office/drawing/2014/main" id="{B7E1DA0E-C993-498E-AA69-5469A34DBB5E}"/>
@@ -6498,6 +6400,11 @@
           </p:cNvGraphicFramePr>
           <p:nvPr>
             <p:ph idx="1"/>
+            <p:extLst>
+              <p:ext uri="{D42A27DB-BD31-4B8C-83A1-F6EECF244321}">
+                <p14:modId xmlns:p14="http://schemas.microsoft.com/office/powerpoint/2010/main" val="3826171295"/>
+              </p:ext>
+            </p:extLst>
           </p:nvPr>
         </p:nvGraphicFramePr>
         <p:xfrm>
@@ -6665,10 +6572,10 @@
       </p:grpSpPr>
       <p:sp>
         <p:nvSpPr>
-          <p:cNvPr id="2" name="Titel 1">
-            <a:extLst>
-              <a:ext uri="{FF2B5EF4-FFF2-40B4-BE49-F238E27FC236}">
-                <a16:creationId xmlns:a16="http://schemas.microsoft.com/office/drawing/2014/main" id="{F42A1DA0-16E4-49A5-8EF0-C57C3155545F}"/>
+          <p:cNvPr id="2" name="Title 1">
+            <a:extLst>
+              <a:ext uri="{FF2B5EF4-FFF2-40B4-BE49-F238E27FC236}">
+                <a16:creationId xmlns:a16="http://schemas.microsoft.com/office/drawing/2014/main" id="{B84EBE5A-E03D-48CB-AEB8-265D94802EDB}"/>
               </a:ext>
             </a:extLst>
           </p:cNvPr>
@@ -6677,6 +6584,34 @@
           </p:cNvSpPr>
           <p:nvPr>
             <p:ph type="title"/>
+          </p:nvPr>
+        </p:nvSpPr>
+        <p:spPr/>
+        <p:txBody>
+          <a:bodyPr/>
+          <a:lstStyle/>
+          <a:p>
+            <a:r>
+              <a:rPr lang="en-US" dirty="0"/>
+              <a:t>What we used</a:t>
+            </a:r>
+          </a:p>
+        </p:txBody>
+      </p:sp>
+      <p:sp>
+        <p:nvSpPr>
+          <p:cNvPr id="3" name="Content Placeholder 2">
+            <a:extLst>
+              <a:ext uri="{FF2B5EF4-FFF2-40B4-BE49-F238E27FC236}">
+                <a16:creationId xmlns:a16="http://schemas.microsoft.com/office/drawing/2014/main" id="{05F042E6-BD8E-4D24-BA68-1AAB050C5675}"/>
+              </a:ext>
+            </a:extLst>
+          </p:cNvPr>
+          <p:cNvSpPr>
+            <a:spLocks noGrp="1"/>
+          </p:cNvSpPr>
+          <p:nvPr>
+            <p:ph idx="1"/>
           </p:nvPr>
         </p:nvSpPr>
         <p:spPr/>
@@ -6689,66 +6624,41 @@
               <a:t>Multi Layer Perceptron Classifier</a:t>
             </a:r>
           </a:p>
-        </p:txBody>
-      </p:sp>
-      <p:sp>
-        <p:nvSpPr>
-          <p:cNvPr id="3" name="Inhaltsplatzhalter 2">
-            <a:extLst>
-              <a:ext uri="{FF2B5EF4-FFF2-40B4-BE49-F238E27FC236}">
-                <a16:creationId xmlns:a16="http://schemas.microsoft.com/office/drawing/2014/main" id="{56667A28-6CB1-4666-8F14-03683D721003}"/>
-              </a:ext>
-            </a:extLst>
-          </p:cNvPr>
-          <p:cNvSpPr>
-            <a:spLocks noGrp="1"/>
-          </p:cNvSpPr>
-          <p:nvPr>
-            <p:ph idx="1"/>
-          </p:nvPr>
-        </p:nvSpPr>
-        <p:spPr/>
-        <p:txBody>
-          <a:bodyPr/>
-          <a:lstStyle/>
-          <a:p>
+          <a:p>
+            <a:pPr lvl="1"/>
             <a:r>
               <a:rPr lang="en-US" dirty="0"/>
-              <a:t>Advantages regarding our problem:</a:t>
-            </a:r>
-          </a:p>
-          <a:p>
-            <a:pPr marL="0" indent="0">
-              <a:buNone/>
-            </a:pPr>
-            <a:r>
-              <a:rPr lang="en-US" sz="2000" dirty="0"/>
-              <a:t> - Good performance on classifying problems</a:t>
-            </a:r>
-            <a:endParaRPr lang="en-US" sz="2000" baseline="30000" dirty="0"/>
+              <a:t>Good for classifying problems</a:t>
+            </a:r>
           </a:p>
           <a:p>
             <a:r>
               <a:rPr lang="en-US" dirty="0"/>
-              <a:t>Weaknesses regarding our Problem: </a:t>
-            </a:r>
-          </a:p>
-          <a:p>
-            <a:pPr marL="0" indent="0">
-              <a:buNone/>
-            </a:pPr>
-            <a:r>
-              <a:rPr lang="en-US" sz="2000" dirty="0"/>
-              <a:t> - Lots of training data needed</a:t>
-            </a:r>
-          </a:p>
-          <a:p>
+              <a:t>Logistic Regression</a:t>
+            </a:r>
+          </a:p>
+          <a:p>
+            <a:pPr lvl="1"/>
             <a:r>
               <a:rPr lang="en-US" dirty="0"/>
-              <a:t>Our best result:</a:t>
-            </a:r>
-          </a:p>
-          <a:p>
+              <a:t>Can be regularized to avoid overfitting</a:t>
+            </a:r>
+          </a:p>
+          <a:p>
+            <a:r>
+              <a:rPr lang="en-US" dirty="0"/>
+              <a:t>Lasso Regression </a:t>
+            </a:r>
+          </a:p>
+          <a:p>
+            <a:pPr lvl="1"/>
+            <a:r>
+              <a:rPr lang="en-US" dirty="0"/>
+              <a:t>Automatically performs feature selection</a:t>
+            </a:r>
+          </a:p>
+          <a:p>
+            <a:pPr lvl="1"/>
             <a:endParaRPr lang="en-US" dirty="0"/>
           </a:p>
         </p:txBody>
@@ -6756,7 +6666,7 @@
     </p:spTree>
     <p:extLst>
       <p:ext uri="{BB962C8B-B14F-4D97-AF65-F5344CB8AC3E}">
-        <p14:creationId xmlns:p14="http://schemas.microsoft.com/office/powerpoint/2010/main" val="1740813137"/>
+        <p14:creationId xmlns:p14="http://schemas.microsoft.com/office/powerpoint/2010/main" val="3874592636"/>
       </p:ext>
     </p:extLst>
   </p:cSld>
@@ -6785,10 +6695,10 @@
       </p:grpSpPr>
       <p:sp>
         <p:nvSpPr>
-          <p:cNvPr id="2" name="Titel 1">
-            <a:extLst>
-              <a:ext uri="{FF2B5EF4-FFF2-40B4-BE49-F238E27FC236}">
-                <a16:creationId xmlns:a16="http://schemas.microsoft.com/office/drawing/2014/main" id="{917D301D-A777-4792-9C10-94B66B0517B4}"/>
+          <p:cNvPr id="2" name="Title 1">
+            <a:extLst>
+              <a:ext uri="{FF2B5EF4-FFF2-40B4-BE49-F238E27FC236}">
+                <a16:creationId xmlns:a16="http://schemas.microsoft.com/office/drawing/2014/main" id="{FE26E031-8ECB-454B-B1BF-055E2E51D453}"/>
               </a:ext>
             </a:extLst>
           </p:cNvPr>
@@ -6806,17 +6716,17 @@
           <a:p>
             <a:r>
               <a:rPr lang="en-US" dirty="0"/>
-              <a:t>Logistic Regression</a:t>
-            </a:r>
-          </a:p>
-        </p:txBody>
-      </p:sp>
-      <p:sp>
-        <p:nvSpPr>
-          <p:cNvPr id="3" name="Inhaltsplatzhalter 2">
-            <a:extLst>
-              <a:ext uri="{FF2B5EF4-FFF2-40B4-BE49-F238E27FC236}">
-                <a16:creationId xmlns:a16="http://schemas.microsoft.com/office/drawing/2014/main" id="{580C7053-EB5A-4FFC-AD28-2B8D55307073}"/>
+              <a:t>Feature Selection (Lasso Model)</a:t>
+            </a:r>
+          </a:p>
+        </p:txBody>
+      </p:sp>
+      <p:sp>
+        <p:nvSpPr>
+          <p:cNvPr id="3" name="Content Placeholder 2">
+            <a:extLst>
+              <a:ext uri="{FF2B5EF4-FFF2-40B4-BE49-F238E27FC236}">
+                <a16:creationId xmlns:a16="http://schemas.microsoft.com/office/drawing/2014/main" id="{11BD7C6F-1B6C-4FF3-8A68-8222BF07BE62}"/>
               </a:ext>
             </a:extLst>
           </p:cNvPr>
@@ -6834,52 +6744,44 @@
           <a:p>
             <a:r>
               <a:rPr lang="en-US" dirty="0"/>
-              <a:t>Advantages regarding our problem:</a:t>
-            </a:r>
-          </a:p>
-          <a:p>
-            <a:pPr marL="0" indent="0">
-              <a:buNone/>
-            </a:pPr>
-            <a:r>
-              <a:rPr lang="en-US" sz="2000" dirty="0"/>
-              <a:t>- Can be regularized to avoid overfitting!</a:t>
-            </a:r>
-          </a:p>
-          <a:p>
+              <a:t>Recursive Feature Elimination and Cross Validation Selection (RFECV)</a:t>
+            </a:r>
+          </a:p>
+          <a:p>
+            <a:pPr lvl="1"/>
             <a:r>
               <a:rPr lang="en-US" dirty="0"/>
-              <a:t>Weaknesses regarding our Problem: </a:t>
-            </a:r>
-          </a:p>
-          <a:p>
-            <a:pPr marL="0" indent="0">
-              <a:buNone/>
-            </a:pPr>
+              <a:t>Used the Lasso Algorithm as model</a:t>
+            </a:r>
+          </a:p>
+          <a:p>
+            <a:pPr lvl="1"/>
             <a:r>
               <a:rPr lang="en-US" dirty="0"/>
-              <a:t> </a:t>
-            </a:r>
-            <a:r>
-              <a:rPr lang="en-US" sz="2000" dirty="0"/>
-              <a:t>- Weak on multiple non-linear boundaries</a:t>
-            </a:r>
-          </a:p>
-          <a:p>
+              <a:t>Used </a:t>
+            </a:r>
+            <a:r>
+              <a:rPr lang="en-US" dirty="0" err="1"/>
+              <a:t>StratisfiedKFold</a:t>
+            </a:r>
             <a:r>
               <a:rPr lang="en-US" dirty="0"/>
-              <a:t>Our best result:</a:t>
-            </a:r>
-          </a:p>
-          <a:p>
-            <a:endParaRPr lang="en-US" dirty="0"/>
+              <a:t> of 20 to split up the data for RFECV</a:t>
+            </a:r>
+          </a:p>
+          <a:p>
+            <a:pPr lvl="1"/>
+            <a:r>
+              <a:rPr lang="en-US" dirty="0"/>
+              <a:t>16 Parameters chosen w/ step of 5</a:t>
+            </a:r>
           </a:p>
         </p:txBody>
       </p:sp>
     </p:spTree>
     <p:extLst>
       <p:ext uri="{BB962C8B-B14F-4D97-AF65-F5344CB8AC3E}">
-        <p14:creationId xmlns:p14="http://schemas.microsoft.com/office/powerpoint/2010/main" val="3613122792"/>
+        <p14:creationId xmlns:p14="http://schemas.microsoft.com/office/powerpoint/2010/main" val="1307682458"/>
       </p:ext>
     </p:extLst>
   </p:cSld>
@@ -6929,7 +6831,7 @@
           <a:p>
             <a:r>
               <a:rPr lang="en-US" dirty="0"/>
-              <a:t>Lasso Regression (Linear)</a:t>
+              <a:t>Prediction Model (Logistic Regression)</a:t>
             </a:r>
           </a:p>
         </p:txBody>
@@ -6955,27 +6857,14 @@
           <a:bodyPr/>
           <a:lstStyle/>
           <a:p>
-            <a:pPr marL="0" indent="0">
-              <a:buNone/>
-            </a:pPr>
-            <a:r>
-              <a:rPr lang="en-US" b="1" dirty="0"/>
-              <a:t>Important Points:</a:t>
-            </a:r>
-          </a:p>
-          <a:p>
             <a:r>
               <a:rPr lang="en-US" dirty="0"/>
-              <a:t>It uses L1 regularization technique (will be discussed later in this article)</a:t>
-            </a:r>
-          </a:p>
-          <a:p>
-            <a:r>
-              <a:rPr lang="en-US" dirty="0"/>
-              <a:t>Since it automatically does feature selection, it is best used when there are more features available</a:t>
-            </a:r>
-          </a:p>
-          <a:p>
+              <a:t>Something about why we use </a:t>
+            </a:r>
+            <a:r>
+              <a:rPr lang="en-US"/>
+              <a:t>this somewhere here</a:t>
+            </a:r>
             <a:endParaRPr lang="en-US" dirty="0"/>
           </a:p>
         </p:txBody>
@@ -6983,7 +6872,7 @@
     </p:spTree>
     <p:extLst>
       <p:ext uri="{BB962C8B-B14F-4D97-AF65-F5344CB8AC3E}">
-        <p14:creationId xmlns:p14="http://schemas.microsoft.com/office/powerpoint/2010/main" val="443737932"/>
+        <p14:creationId xmlns:p14="http://schemas.microsoft.com/office/powerpoint/2010/main" val="468689115"/>
       </p:ext>
     </p:extLst>
   </p:cSld>

</xml_diff>

<commit_message>
some more comments added
</commit_message>
<xml_diff>
--- a/Presentation.pptx
+++ b/Presentation.pptx
@@ -131,7 +131,7 @@
 <file path=ppt/charts/chart1.xml><?xml version="1.0" encoding="utf-8"?>
 <c:chartSpace xmlns:c="http://schemas.openxmlformats.org/drawingml/2006/chart" xmlns:a="http://schemas.openxmlformats.org/drawingml/2006/main" xmlns:r="http://schemas.openxmlformats.org/officeDocument/2006/relationships" xmlns:c16r2="http://schemas.microsoft.com/office/drawing/2015/06/chart">
   <c:date1904 val="0"/>
-  <c:lang val="en-US"/>
+  <c:lang val="de-DE"/>
   <c:roundedCorners val="0"/>
   <mc:AlternateContent xmlns:mc="http://schemas.openxmlformats.org/markup-compatibility/2006">
     <mc:Choice xmlns:c14="http://schemas.microsoft.com/office/drawing/2007/8/2/chart" Requires="c14">
@@ -452,7 +452,7 @@
 <file path=ppt/charts/chart2.xml><?xml version="1.0" encoding="utf-8"?>
 <c:chartSpace xmlns:c="http://schemas.openxmlformats.org/drawingml/2006/chart" xmlns:a="http://schemas.openxmlformats.org/drawingml/2006/main" xmlns:r="http://schemas.openxmlformats.org/officeDocument/2006/relationships" xmlns:c16r2="http://schemas.microsoft.com/office/drawing/2015/06/chart">
   <c:date1904 val="0"/>
-  <c:lang val="en-US"/>
+  <c:lang val="de-DE"/>
   <c:roundedCorners val="0"/>
   <mc:AlternateContent xmlns:mc="http://schemas.openxmlformats.org/markup-compatibility/2006">
     <mc:Choice xmlns:c14="http://schemas.microsoft.com/office/drawing/2007/8/2/chart" Requires="c14">
@@ -736,7 +736,7 @@
 <file path=ppt/charts/chart3.xml><?xml version="1.0" encoding="utf-8"?>
 <c:chartSpace xmlns:c="http://schemas.openxmlformats.org/drawingml/2006/chart" xmlns:a="http://schemas.openxmlformats.org/drawingml/2006/main" xmlns:r="http://schemas.openxmlformats.org/officeDocument/2006/relationships" xmlns:c16r2="http://schemas.microsoft.com/office/drawing/2015/06/chart">
   <c:date1904 val="0"/>
-  <c:lang val="en-US"/>
+  <c:lang val="de-DE"/>
   <c:roundedCorners val="0"/>
   <mc:AlternateContent xmlns:mc="http://schemas.openxmlformats.org/markup-compatibility/2006">
     <mc:Choice xmlns:c14="http://schemas.microsoft.com/office/drawing/2007/8/2/chart" Requires="c14">
@@ -19609,7 +19609,7 @@
           <a:p>
             <a:fld id="{297A166E-ACF1-4C2F-AD43-1E0B732BAB04}" type="slidenum">
               <a:rPr lang="en-US" smtClean="0"/>
-              <a:t>‹#›</a:t>
+              <a:t>‹Nr.›</a:t>
             </a:fld>
             <a:endParaRPr lang="en-US"/>
           </a:p>
@@ -20517,7 +20517,7 @@
           <a:p>
             <a:fld id="{07F4A872-BB05-448F-BC49-4E19CC5041AD}" type="slidenum">
               <a:rPr lang="en-US" smtClean="0"/>
-              <a:t>‹#›</a:t>
+              <a:t>‹Nr.›</a:t>
             </a:fld>
             <a:endParaRPr lang="en-US"/>
           </a:p>
@@ -20725,7 +20725,7 @@
           <a:p>
             <a:fld id="{07F4A872-BB05-448F-BC49-4E19CC5041AD}" type="slidenum">
               <a:rPr lang="en-US" smtClean="0"/>
-              <a:t>‹#›</a:t>
+              <a:t>‹Nr.›</a:t>
             </a:fld>
             <a:endParaRPr lang="en-US"/>
           </a:p>
@@ -20981,7 +20981,7 @@
           <a:p>
             <a:fld id="{07F4A872-BB05-448F-BC49-4E19CC5041AD}" type="slidenum">
               <a:rPr lang="en-US" smtClean="0"/>
-              <a:t>‹#›</a:t>
+              <a:t>‹Nr.›</a:t>
             </a:fld>
             <a:endParaRPr lang="en-US"/>
           </a:p>
@@ -21155,7 +21155,7 @@
           <a:p>
             <a:fld id="{07F4A872-BB05-448F-BC49-4E19CC5041AD}" type="slidenum">
               <a:rPr lang="en-US" smtClean="0"/>
-              <a:t>‹#›</a:t>
+              <a:t>‹Nr.›</a:t>
             </a:fld>
             <a:endParaRPr lang="en-US"/>
           </a:p>
@@ -21498,7 +21498,7 @@
           <a:p>
             <a:fld id="{07F4A872-BB05-448F-BC49-4E19CC5041AD}" type="slidenum">
               <a:rPr lang="en-US" smtClean="0"/>
-              <a:t>‹#›</a:t>
+              <a:t>‹Nr.›</a:t>
             </a:fld>
             <a:endParaRPr lang="en-US"/>
           </a:p>
@@ -21773,7 +21773,7 @@
           <a:p>
             <a:fld id="{07F4A872-BB05-448F-BC49-4E19CC5041AD}" type="slidenum">
               <a:rPr lang="en-US" smtClean="0"/>
-              <a:t>‹#›</a:t>
+              <a:t>‹Nr.›</a:t>
             </a:fld>
             <a:endParaRPr lang="en-US"/>
           </a:p>
@@ -22152,7 +22152,7 @@
           <a:p>
             <a:fld id="{07F4A872-BB05-448F-BC49-4E19CC5041AD}" type="slidenum">
               <a:rPr lang="en-US" smtClean="0"/>
-              <a:t>‹#›</a:t>
+              <a:t>‹Nr.›</a:t>
             </a:fld>
             <a:endParaRPr lang="en-US"/>
           </a:p>
@@ -22270,7 +22270,7 @@
           <a:p>
             <a:fld id="{07F4A872-BB05-448F-BC49-4E19CC5041AD}" type="slidenum">
               <a:rPr lang="en-US" smtClean="0"/>
-              <a:t>‹#›</a:t>
+              <a:t>‹Nr.›</a:t>
             </a:fld>
             <a:endParaRPr lang="en-US"/>
           </a:p>
@@ -22449,7 +22449,7 @@
           <a:p>
             <a:fld id="{07F4A872-BB05-448F-BC49-4E19CC5041AD}" type="slidenum">
               <a:rPr lang="en-US" smtClean="0"/>
-              <a:t>‹#›</a:t>
+              <a:t>‹Nr.›</a:t>
             </a:fld>
             <a:endParaRPr lang="en-US"/>
           </a:p>
@@ -22816,7 +22816,7 @@
           <a:p>
             <a:fld id="{07F4A872-BB05-448F-BC49-4E19CC5041AD}" type="slidenum">
               <a:rPr lang="en-US" smtClean="0"/>
-              <a:t>‹#›</a:t>
+              <a:t>‹Nr.›</a:t>
             </a:fld>
             <a:endParaRPr lang="en-US"/>
           </a:p>
@@ -23177,7 +23177,7 @@
           <a:p>
             <a:fld id="{07F4A872-BB05-448F-BC49-4E19CC5041AD}" type="slidenum">
               <a:rPr lang="en-US" smtClean="0"/>
-              <a:t>‹#›</a:t>
+              <a:t>‹Nr.›</a:t>
             </a:fld>
             <a:endParaRPr lang="en-US"/>
           </a:p>
@@ -23496,7 +23496,7 @@
           <a:p>
             <a:fld id="{07F4A872-BB05-448F-BC49-4E19CC5041AD}" type="slidenum">
               <a:rPr lang="en-US" smtClean="0"/>
-              <a:t>‹#›</a:t>
+              <a:t>‹Nr.›</a:t>
             </a:fld>
             <a:endParaRPr lang="en-US"/>
           </a:p>
@@ -26248,7 +26248,7 @@
         </p:blipFill>
         <p:spPr>
           <a:xfrm>
-            <a:off x="6096000" y="3686412"/>
+            <a:off x="6096000" y="3297621"/>
             <a:ext cx="3980186" cy="2960264"/>
           </a:xfrm>
           <a:prstGeom prst="rect">
@@ -26289,7 +26289,7 @@
         </p:blipFill>
         <p:spPr>
           <a:xfrm>
-            <a:off x="1606547" y="3686412"/>
+            <a:off x="1524485" y="3297621"/>
             <a:ext cx="3980187" cy="2960264"/>
           </a:xfrm>
           <a:prstGeom prst="rect">

</xml_diff>

<commit_message>
graphs for alpha and tolerance
</commit_message>
<xml_diff>
--- a/Presentation.pptx
+++ b/Presentation.pptx
@@ -12894,8 +12894,8 @@
       </dsp:nvSpPr>
       <dsp:spPr>
         <a:xfrm rot="5400000">
-          <a:off x="6100982" y="-2295230"/>
-          <a:ext cx="1477458" cy="6437376"/>
+          <a:off x="6291245" y="-2686381"/>
+          <a:ext cx="703563" cy="6252260"/>
         </a:xfrm>
         <a:prstGeom prst="round2SameRect">
           <a:avLst/>
@@ -12938,12 +12938,12 @@
         <a:fontRef idx="minor"/>
       </dsp:style>
       <dsp:txBody>
-        <a:bodyPr spcFirstLastPara="0" vert="horz" wrap="square" lIns="160020" tIns="80010" rIns="160020" bIns="80010" numCol="1" spcCol="1270" anchor="ctr" anchorCtr="0">
+        <a:bodyPr spcFirstLastPara="0" vert="horz" wrap="square" lIns="114300" tIns="57150" rIns="114300" bIns="57150" numCol="1" spcCol="1270" anchor="ctr" anchorCtr="0">
           <a:noAutofit/>
         </a:bodyPr>
         <a:lstStyle/>
         <a:p>
-          <a:pPr marL="285750" lvl="1" indent="-285750" algn="l" defTabSz="1866900">
+          <a:pPr marL="285750" lvl="1" indent="-285750" algn="l" defTabSz="1333500">
             <a:lnSpc>
               <a:spcPct val="90000"/>
             </a:lnSpc>
@@ -12956,14 +12956,14 @@
             <a:buChar char="•"/>
           </a:pPr>
           <a:r>
-            <a:rPr lang="en-US" sz="4200" kern="1200" dirty="0"/>
+            <a:rPr lang="en-US" sz="3000" kern="1200" dirty="0"/>
             <a:t>Constant that multiplies the L1 term</a:t>
           </a:r>
         </a:p>
       </dsp:txBody>
       <dsp:txXfrm rot="-5400000">
-        <a:off x="3621023" y="256853"/>
-        <a:ext cx="6365252" cy="1333210"/>
+        <a:off x="3516897" y="122312"/>
+        <a:ext cx="6217915" cy="634873"/>
       </dsp:txXfrm>
     </dsp:sp>
     <dsp:sp modelId="{B976DC7D-4135-4E72-A3BF-A8912CBA41E1}">
@@ -12973,8 +12973,8 @@
       </dsp:nvSpPr>
       <dsp:spPr>
         <a:xfrm>
-          <a:off x="0" y="46"/>
-          <a:ext cx="3621024" cy="1846823"/>
+          <a:off x="0" y="22"/>
+          <a:ext cx="3516896" cy="879454"/>
         </a:xfrm>
         <a:prstGeom prst="roundRect">
           <a:avLst/>
@@ -13015,12 +13015,12 @@
         </a:fontRef>
       </dsp:style>
       <dsp:txBody>
-        <a:bodyPr spcFirstLastPara="0" vert="horz" wrap="square" lIns="198120" tIns="99060" rIns="198120" bIns="99060" numCol="1" spcCol="1270" anchor="ctr" anchorCtr="0">
+        <a:bodyPr spcFirstLastPara="0" vert="horz" wrap="square" lIns="167640" tIns="83820" rIns="167640" bIns="83820" numCol="1" spcCol="1270" anchor="ctr" anchorCtr="0">
           <a:noAutofit/>
         </a:bodyPr>
         <a:lstStyle/>
         <a:p>
-          <a:pPr marL="0" lvl="0" indent="0" algn="ctr" defTabSz="2311400">
+          <a:pPr marL="0" lvl="0" indent="0" algn="ctr" defTabSz="1955800">
             <a:lnSpc>
               <a:spcPct val="90000"/>
             </a:lnSpc>
@@ -13033,14 +13033,14 @@
             <a:buNone/>
           </a:pPr>
           <a:r>
-            <a:rPr lang="en-US" sz="5200" kern="1200" dirty="0"/>
+            <a:rPr lang="en-US" sz="4400" kern="1200" dirty="0"/>
             <a:t>Alpha = 0.03</a:t>
           </a:r>
         </a:p>
       </dsp:txBody>
       <dsp:txXfrm>
-        <a:off x="90154" y="90200"/>
-        <a:ext cx="3440716" cy="1666515"/>
+        <a:off x="42931" y="42953"/>
+        <a:ext cx="3431034" cy="793592"/>
       </dsp:txXfrm>
     </dsp:sp>
     <dsp:sp modelId="{79CA73BC-09E8-4230-8F38-FDB274B1A3D4}">
@@ -13050,8 +13050,8 @@
       </dsp:nvSpPr>
       <dsp:spPr>
         <a:xfrm rot="5400000">
-          <a:off x="6100982" y="-356065"/>
-          <a:ext cx="1477458" cy="6437376"/>
+          <a:off x="6291245" y="-1762954"/>
+          <a:ext cx="703563" cy="6252260"/>
         </a:xfrm>
         <a:prstGeom prst="round2SameRect">
           <a:avLst/>
@@ -13094,12 +13094,12 @@
         <a:fontRef idx="minor"/>
       </dsp:style>
       <dsp:txBody>
-        <a:bodyPr spcFirstLastPara="0" vert="horz" wrap="square" lIns="160020" tIns="80010" rIns="160020" bIns="80010" numCol="1" spcCol="1270" anchor="ctr" anchorCtr="0">
+        <a:bodyPr spcFirstLastPara="0" vert="horz" wrap="square" lIns="114300" tIns="57150" rIns="114300" bIns="57150" numCol="1" spcCol="1270" anchor="ctr" anchorCtr="0">
           <a:noAutofit/>
         </a:bodyPr>
         <a:lstStyle/>
         <a:p>
-          <a:pPr marL="285750" lvl="1" indent="-285750" algn="l" defTabSz="1866900">
+          <a:pPr marL="285750" lvl="1" indent="-285750" algn="l" defTabSz="1333500">
             <a:lnSpc>
               <a:spcPct val="90000"/>
             </a:lnSpc>
@@ -13112,14 +13112,14 @@
             <a:buChar char="•"/>
           </a:pPr>
           <a:r>
-            <a:rPr lang="en-US" sz="4200" kern="1200" dirty="0"/>
+            <a:rPr lang="en-US" sz="3000" kern="1200" dirty="0"/>
             <a:t>Stopping point for optimization</a:t>
           </a:r>
         </a:p>
       </dsp:txBody>
       <dsp:txXfrm rot="-5400000">
-        <a:off x="3621023" y="2196018"/>
-        <a:ext cx="6365252" cy="1333210"/>
+        <a:off x="3516897" y="1045739"/>
+        <a:ext cx="6217915" cy="634873"/>
       </dsp:txXfrm>
     </dsp:sp>
     <dsp:sp modelId="{FD699906-6852-46B0-9438-E75740076D22}">
@@ -13129,8 +13129,8 @@
       </dsp:nvSpPr>
       <dsp:spPr>
         <a:xfrm>
-          <a:off x="0" y="1939210"/>
-          <a:ext cx="3621024" cy="1846823"/>
+          <a:off x="0" y="923448"/>
+          <a:ext cx="3516896" cy="879454"/>
         </a:xfrm>
         <a:prstGeom prst="roundRect">
           <a:avLst/>
@@ -13171,12 +13171,12 @@
         </a:fontRef>
       </dsp:style>
       <dsp:txBody>
-        <a:bodyPr spcFirstLastPara="0" vert="horz" wrap="square" lIns="198120" tIns="99060" rIns="198120" bIns="99060" numCol="1" spcCol="1270" anchor="ctr" anchorCtr="0">
+        <a:bodyPr spcFirstLastPara="0" vert="horz" wrap="square" lIns="167640" tIns="83820" rIns="167640" bIns="83820" numCol="1" spcCol="1270" anchor="ctr" anchorCtr="0">
           <a:noAutofit/>
         </a:bodyPr>
         <a:lstStyle/>
         <a:p>
-          <a:pPr marL="0" lvl="0" indent="0" algn="ctr" defTabSz="2311400">
+          <a:pPr marL="0" lvl="0" indent="0" algn="ctr" defTabSz="1955800">
             <a:lnSpc>
               <a:spcPct val="90000"/>
             </a:lnSpc>
@@ -13189,14 +13189,14 @@
             <a:buNone/>
           </a:pPr>
           <a:r>
-            <a:rPr lang="en-US" sz="5200" kern="1200" dirty="0"/>
+            <a:rPr lang="en-US" sz="4400" kern="1200" dirty="0"/>
             <a:t>Tol = 0.01</a:t>
           </a:r>
         </a:p>
       </dsp:txBody>
       <dsp:txXfrm>
-        <a:off x="90154" y="2029364"/>
-        <a:ext cx="3440716" cy="1666515"/>
+        <a:off x="42931" y="966379"/>
+        <a:ext cx="3431034" cy="793592"/>
       </dsp:txXfrm>
     </dsp:sp>
   </dsp:spTree>
@@ -29959,7 +29959,7 @@
           <a:p>
             <a:r>
               <a:rPr lang="en-US" dirty="0"/>
-              <a:t>Feature Selection (Lasso/Logistic Model)</a:t>
+              <a:t>Feature Selection (Lasso)</a:t>
             </a:r>
           </a:p>
         </p:txBody>
@@ -30023,10 +30023,10 @@
       </p:sp>
       <p:pic>
         <p:nvPicPr>
-          <p:cNvPr id="7" name="Picture 6" descr="A screenshot of a cell phone&#10;&#10;Description automatically generated">
+          <p:cNvPr id="6" name="Picture 5" descr="A screenshot of a cell phone&#10;&#10;Description automatically generated">
             <a:extLst>
               <a:ext uri="{FF2B5EF4-FFF2-40B4-BE49-F238E27FC236}">
-                <a16:creationId xmlns:a16="http://schemas.microsoft.com/office/drawing/2014/main" id="{70E5D0F1-C82B-4EC0-B8B9-A73D890431C6}"/>
+                <a16:creationId xmlns:a16="http://schemas.microsoft.com/office/drawing/2014/main" id="{AAE2251A-A931-4EEF-B6A3-42CDBB40ABA9}"/>
               </a:ext>
             </a:extLst>
           </p:cNvPr>
@@ -30049,49 +30049,8 @@
         </p:blipFill>
         <p:spPr>
           <a:xfrm>
-            <a:off x="6096000" y="3686412"/>
-            <a:ext cx="3980186" cy="2960264"/>
-          </a:xfrm>
-          <a:prstGeom prst="rect">
-            <a:avLst/>
-          </a:prstGeom>
-          <a:ln>
-            <a:solidFill>
-              <a:schemeClr val="accent1"/>
-            </a:solidFill>
-          </a:ln>
-        </p:spPr>
-      </p:pic>
-      <p:pic>
-        <p:nvPicPr>
-          <p:cNvPr id="6" name="Picture 5" descr="A screenshot of a cell phone&#10;&#10;Description automatically generated">
-            <a:extLst>
-              <a:ext uri="{FF2B5EF4-FFF2-40B4-BE49-F238E27FC236}">
-                <a16:creationId xmlns:a16="http://schemas.microsoft.com/office/drawing/2014/main" id="{AAE2251A-A931-4EEF-B6A3-42CDBB40ABA9}"/>
-              </a:ext>
-            </a:extLst>
-          </p:cNvPr>
-          <p:cNvPicPr>
-            <a:picLocks noChangeAspect="1"/>
-          </p:cNvPicPr>
-          <p:nvPr/>
-        </p:nvPicPr>
-        <p:blipFill>
-          <a:blip r:embed="rId3">
-            <a:extLst>
-              <a:ext uri="{28A0092B-C50C-407E-A947-70E740481C1C}">
-                <a14:useLocalDpi xmlns:a14="http://schemas.microsoft.com/office/drawing/2010/main" val="0"/>
-              </a:ext>
-            </a:extLst>
-          </a:blip>
-          <a:stretch>
-            <a:fillRect/>
-          </a:stretch>
-        </p:blipFill>
-        <p:spPr>
-          <a:xfrm>
-            <a:off x="1606547" y="3686412"/>
-            <a:ext cx="3980187" cy="2960264"/>
+            <a:off x="7101841" y="2428050"/>
+            <a:ext cx="4626614" cy="3441044"/>
           </a:xfrm>
           <a:prstGeom prst="rect">
             <a:avLst/>
@@ -30184,14 +30143,14 @@
             <p:ph idx="1"/>
             <p:extLst>
               <p:ext uri="{D42A27DB-BD31-4B8C-83A1-F6EECF244321}">
-                <p14:modId xmlns:p14="http://schemas.microsoft.com/office/powerpoint/2010/main" val="1198151128"/>
+                <p14:modId xmlns:p14="http://schemas.microsoft.com/office/powerpoint/2010/main" val="1442412406"/>
               </p:ext>
             </p:extLst>
           </p:nvPr>
         </p:nvGraphicFramePr>
         <p:xfrm>
           <a:off x="1096963" y="2098515"/>
-          <a:ext cx="10058400" cy="3786080"/>
+          <a:ext cx="9769157" cy="1802925"/>
         </p:xfrm>
         <a:graphic>
           <a:graphicData uri="http://schemas.openxmlformats.org/drawingml/2006/diagram">
@@ -30199,6 +30158,88 @@
           </a:graphicData>
         </a:graphic>
       </p:graphicFrame>
+      <p:pic>
+        <p:nvPicPr>
+          <p:cNvPr id="4" name="Picture 3" descr="A screenshot of a cell phone&#10;&#10;Description automatically generated">
+            <a:extLst>
+              <a:ext uri="{FF2B5EF4-FFF2-40B4-BE49-F238E27FC236}">
+                <a16:creationId xmlns:a16="http://schemas.microsoft.com/office/drawing/2014/main" id="{31418438-4840-445F-9BB6-CFACCE74F7AC}"/>
+              </a:ext>
+            </a:extLst>
+          </p:cNvPr>
+          <p:cNvPicPr>
+            <a:picLocks noChangeAspect="1"/>
+          </p:cNvPicPr>
+          <p:nvPr/>
+        </p:nvPicPr>
+        <p:blipFill>
+          <a:blip r:embed="rId8">
+            <a:extLst>
+              <a:ext uri="{28A0092B-C50C-407E-A947-70E740481C1C}">
+                <a14:useLocalDpi xmlns:a14="http://schemas.microsoft.com/office/drawing/2010/main" val="0"/>
+              </a:ext>
+            </a:extLst>
+          </a:blip>
+          <a:stretch>
+            <a:fillRect/>
+          </a:stretch>
+        </p:blipFill>
+        <p:spPr>
+          <a:xfrm>
+            <a:off x="2736028" y="3901439"/>
+            <a:ext cx="3100898" cy="2306293"/>
+          </a:xfrm>
+          <a:prstGeom prst="rect">
+            <a:avLst/>
+          </a:prstGeom>
+          <a:ln>
+            <a:solidFill>
+              <a:schemeClr val="accent1"/>
+            </a:solidFill>
+          </a:ln>
+        </p:spPr>
+      </p:pic>
+      <p:pic>
+        <p:nvPicPr>
+          <p:cNvPr id="7" name="Picture 6" descr="A screenshot of a social media post&#10;&#10;Description automatically generated">
+            <a:extLst>
+              <a:ext uri="{FF2B5EF4-FFF2-40B4-BE49-F238E27FC236}">
+                <a16:creationId xmlns:a16="http://schemas.microsoft.com/office/drawing/2014/main" id="{A060C59A-AF57-4F13-9023-205C2DB9F26F}"/>
+              </a:ext>
+            </a:extLst>
+          </p:cNvPr>
+          <p:cNvPicPr>
+            <a:picLocks noChangeAspect="1"/>
+          </p:cNvPicPr>
+          <p:nvPr/>
+        </p:nvPicPr>
+        <p:blipFill>
+          <a:blip r:embed="rId9">
+            <a:extLst>
+              <a:ext uri="{28A0092B-C50C-407E-A947-70E740481C1C}">
+                <a14:useLocalDpi xmlns:a14="http://schemas.microsoft.com/office/drawing/2010/main" val="0"/>
+              </a:ext>
+            </a:extLst>
+          </a:blip>
+          <a:stretch>
+            <a:fillRect/>
+          </a:stretch>
+        </p:blipFill>
+        <p:spPr>
+          <a:xfrm>
+            <a:off x="8054782" y="3901440"/>
+            <a:ext cx="3100898" cy="2306293"/>
+          </a:xfrm>
+          <a:prstGeom prst="rect">
+            <a:avLst/>
+          </a:prstGeom>
+          <a:ln>
+            <a:solidFill>
+              <a:schemeClr val="accent1"/>
+            </a:solidFill>
+          </a:ln>
+        </p:spPr>
+      </p:pic>
     </p:spTree>
     <p:extLst>
       <p:ext uri="{BB962C8B-B14F-4D97-AF65-F5344CB8AC3E}">

</xml_diff>